<commit_message>
wrong phone number ARGH
</commit_message>
<xml_diff>
--- a/CV MC.pptx
+++ b/CV MC.pptx
@@ -5,10 +5,12 @@
     <p:sldMasterId id="2147483648" r:id="rId1"/>
   </p:sldMasterIdLst>
   <p:notesMasterIdLst>
-    <p:notesMasterId r:id="rId3"/>
+    <p:notesMasterId r:id="rId5"/>
   </p:notesMasterIdLst>
   <p:sldIdLst>
     <p:sldId id="258" r:id="rId2"/>
+    <p:sldId id="259" r:id="rId3"/>
+    <p:sldId id="260" r:id="rId4"/>
   </p:sldIdLst>
   <p:sldSz cx="6858000" cy="9906000" type="A4"/>
   <p:notesSz cx="6858000" cy="9144000"/>
@@ -212,7 +214,7 @@
           <a:p>
             <a:fld id="{6C6D5F1F-E3CB-874F-98F9-DDA3CA681C75}" type="datetimeFigureOut">
               <a:rPr lang="en-US" smtClean="0"/>
-              <a:t>9/29/2017</a:t>
+              <a:t>10/17/2017</a:t>
             </a:fld>
             <a:endParaRPr lang="en-US"/>
           </a:p>
@@ -745,7 +747,7 @@
           <a:p>
             <a:fld id="{E067A70D-6EFA-0C4B-8AE2-D602863194E8}" type="datetimeFigureOut">
               <a:rPr lang="en-US" smtClean="0"/>
-              <a:t>9/29/2017</a:t>
+              <a:t>10/17/2017</a:t>
             </a:fld>
             <a:endParaRPr lang="en-US"/>
           </a:p>
@@ -915,7 +917,7 @@
           <a:p>
             <a:fld id="{E067A70D-6EFA-0C4B-8AE2-D602863194E8}" type="datetimeFigureOut">
               <a:rPr lang="en-US" smtClean="0"/>
-              <a:t>9/29/2017</a:t>
+              <a:t>10/17/2017</a:t>
             </a:fld>
             <a:endParaRPr lang="en-US"/>
           </a:p>
@@ -1095,7 +1097,7 @@
           <a:p>
             <a:fld id="{E067A70D-6EFA-0C4B-8AE2-D602863194E8}" type="datetimeFigureOut">
               <a:rPr lang="en-US" smtClean="0"/>
-              <a:t>9/29/2017</a:t>
+              <a:t>10/17/2017</a:t>
             </a:fld>
             <a:endParaRPr lang="en-US"/>
           </a:p>
@@ -1265,7 +1267,7 @@
           <a:p>
             <a:fld id="{E067A70D-6EFA-0C4B-8AE2-D602863194E8}" type="datetimeFigureOut">
               <a:rPr lang="en-US" smtClean="0"/>
-              <a:t>9/29/2017</a:t>
+              <a:t>10/17/2017</a:t>
             </a:fld>
             <a:endParaRPr lang="en-US"/>
           </a:p>
@@ -1511,7 +1513,7 @@
           <a:p>
             <a:fld id="{E067A70D-6EFA-0C4B-8AE2-D602863194E8}" type="datetimeFigureOut">
               <a:rPr lang="en-US" smtClean="0"/>
-              <a:t>9/29/2017</a:t>
+              <a:t>10/17/2017</a:t>
             </a:fld>
             <a:endParaRPr lang="en-US"/>
           </a:p>
@@ -1799,7 +1801,7 @@
           <a:p>
             <a:fld id="{E067A70D-6EFA-0C4B-8AE2-D602863194E8}" type="datetimeFigureOut">
               <a:rPr lang="en-US" smtClean="0"/>
-              <a:t>9/29/2017</a:t>
+              <a:t>10/17/2017</a:t>
             </a:fld>
             <a:endParaRPr lang="en-US"/>
           </a:p>
@@ -2221,7 +2223,7 @@
           <a:p>
             <a:fld id="{E067A70D-6EFA-0C4B-8AE2-D602863194E8}" type="datetimeFigureOut">
               <a:rPr lang="en-US" smtClean="0"/>
-              <a:t>9/29/2017</a:t>
+              <a:t>10/17/2017</a:t>
             </a:fld>
             <a:endParaRPr lang="en-US"/>
           </a:p>
@@ -2339,7 +2341,7 @@
           <a:p>
             <a:fld id="{E067A70D-6EFA-0C4B-8AE2-D602863194E8}" type="datetimeFigureOut">
               <a:rPr lang="en-US" smtClean="0"/>
-              <a:t>9/29/2017</a:t>
+              <a:t>10/17/2017</a:t>
             </a:fld>
             <a:endParaRPr lang="en-US"/>
           </a:p>
@@ -2434,7 +2436,7 @@
           <a:p>
             <a:fld id="{E067A70D-6EFA-0C4B-8AE2-D602863194E8}" type="datetimeFigureOut">
               <a:rPr lang="en-US" smtClean="0"/>
-              <a:t>9/29/2017</a:t>
+              <a:t>10/17/2017</a:t>
             </a:fld>
             <a:endParaRPr lang="en-US"/>
           </a:p>
@@ -2711,7 +2713,7 @@
           <a:p>
             <a:fld id="{E067A70D-6EFA-0C4B-8AE2-D602863194E8}" type="datetimeFigureOut">
               <a:rPr lang="en-US" smtClean="0"/>
-              <a:t>9/29/2017</a:t>
+              <a:t>10/17/2017</a:t>
             </a:fld>
             <a:endParaRPr lang="en-US"/>
           </a:p>
@@ -2964,7 +2966,7 @@
           <a:p>
             <a:fld id="{E067A70D-6EFA-0C4B-8AE2-D602863194E8}" type="datetimeFigureOut">
               <a:rPr lang="en-US" smtClean="0"/>
-              <a:t>9/29/2017</a:t>
+              <a:t>10/17/2017</a:t>
             </a:fld>
             <a:endParaRPr lang="en-US"/>
           </a:p>
@@ -3177,7 +3179,7 @@
           <a:p>
             <a:fld id="{E067A70D-6EFA-0C4B-8AE2-D602863194E8}" type="datetimeFigureOut">
               <a:rPr lang="en-US" smtClean="0"/>
-              <a:t>9/29/2017</a:t>
+              <a:t>10/17/2017</a:t>
             </a:fld>
             <a:endParaRPr lang="en-US"/>
           </a:p>
@@ -3833,7 +3835,7 @@
         <p:spPr>
           <a:xfrm>
             <a:off x="184566" y="214592"/>
-            <a:ext cx="4108265" cy="6070893"/>
+            <a:ext cx="4108265" cy="6232475"/>
           </a:xfrm>
           <a:prstGeom prst="rect">
             <a:avLst/>
@@ -3883,7 +3885,14 @@
               <a:rPr lang="en-GB" sz="1050" b="1" dirty="0"/>
               <a:t> 2012 – July 2017.</a:t>
             </a:r>
-            <a:endParaRPr lang="pt-PT" sz="1050" b="1" dirty="0"/>
+          </a:p>
+          <a:p>
+            <a:pPr algn="just"/>
+            <a:r>
+              <a:rPr lang="en-GB" sz="1050" dirty="0"/>
+              <a:t>Bachelor of Science</a:t>
+            </a:r>
+            <a:endParaRPr lang="pt-PT" sz="1050" dirty="0"/>
           </a:p>
           <a:p>
             <a:pPr algn="just"/>
@@ -3944,10 +3953,6 @@
               <a:rPr lang="pt-PT" sz="1050" dirty="0"/>
               <a:t> </a:t>
             </a:r>
-          </a:p>
-          <a:p>
-            <a:pPr algn="just"/>
-            <a:endParaRPr lang="pt-PT" sz="1050" dirty="0"/>
           </a:p>
           <a:p>
             <a:pPr algn="just"/>
@@ -4129,12 +4134,12 @@
               <a:t> is a student created organization whose goal is to find paid work and to share the workload with other like minded students.  With </a:t>
             </a:r>
             <a:r>
-              <a:rPr lang="en-US" sz="1050"/>
-              <a:t>opprDev </a:t>
+              <a:rPr lang="en-US" sz="1050" dirty="0" err="1"/>
+              <a:t>opprDev</a:t>
             </a:r>
             <a:r>
               <a:rPr lang="en-US" sz="1050" dirty="0"/>
-              <a:t>I further developed my frontend programming skills.</a:t>
+              <a:t> I further developed my frontend programming skills.</a:t>
             </a:r>
           </a:p>
           <a:p>
@@ -4343,7 +4348,7 @@
                   <a:srgbClr val="FFFFFF"/>
                 </a:solidFill>
               </a:rPr>
-              <a:t>+351 91 399 39 37</a:t>
+              <a:t>+351 91 399 30 37</a:t>
             </a:r>
           </a:p>
           <a:p>
@@ -4747,7 +4752,7 @@
             <a:pPr algn="just"/>
             <a:r>
               <a:rPr lang="en-GB" sz="1050" dirty="0"/>
-              <a:t>I’m obsessed with old movies, all types of Latino music and traveling. </a:t>
+              <a:t>I am obsessed with old movies, all types of Latino music and traveling. </a:t>
             </a:r>
             <a:endParaRPr lang="pt-PT" sz="1050" dirty="0"/>
           </a:p>
@@ -5225,6 +5230,698 @@
     <p:extLst>
       <p:ext uri="{BB962C8B-B14F-4D97-AF65-F5344CB8AC3E}">
         <p14:creationId xmlns:p14="http://schemas.microsoft.com/office/powerpoint/2010/main" val="2573843294"/>
+      </p:ext>
+    </p:extLst>
+  </p:cSld>
+  <p:clrMapOvr>
+    <a:masterClrMapping/>
+  </p:clrMapOvr>
+</p:sld>
+</file>
+
+<file path=ppt/slides/slide2.xml><?xml version="1.0" encoding="utf-8"?>
+<p:sld xmlns:a="http://schemas.openxmlformats.org/drawingml/2006/main" xmlns:r="http://schemas.openxmlformats.org/officeDocument/2006/relationships" xmlns:p="http://schemas.openxmlformats.org/presentationml/2006/main">
+  <p:cSld>
+    <p:spTree>
+      <p:nvGrpSpPr>
+        <p:cNvPr id="1" name=""/>
+        <p:cNvGrpSpPr/>
+        <p:nvPr/>
+      </p:nvGrpSpPr>
+      <p:grpSpPr>
+        <a:xfrm>
+          <a:off x="0" y="0"/>
+          <a:ext cx="0" cy="0"/>
+          <a:chOff x="0" y="0"/>
+          <a:chExt cx="0" cy="0"/>
+        </a:xfrm>
+      </p:grpSpPr>
+      <p:sp>
+        <p:nvSpPr>
+          <p:cNvPr id="4" name="Rectangle 3">
+            <a:extLst>
+              <a:ext uri="{FF2B5EF4-FFF2-40B4-BE49-F238E27FC236}">
+                <a16:creationId xmlns:a16="http://schemas.microsoft.com/office/drawing/2014/main" id="{9F3DBFD1-8B52-4780-9A0B-E0527A9F45E3}"/>
+              </a:ext>
+            </a:extLst>
+          </p:cNvPr>
+          <p:cNvSpPr/>
+          <p:nvPr/>
+        </p:nvSpPr>
+        <p:spPr>
+          <a:xfrm>
+            <a:off x="1" y="-57085"/>
+            <a:ext cx="6858000" cy="1530285"/>
+          </a:xfrm>
+          <a:prstGeom prst="rect">
+            <a:avLst/>
+          </a:prstGeom>
+          <a:solidFill>
+            <a:schemeClr val="tx1">
+              <a:lumMod val="50000"/>
+              <a:lumOff val="50000"/>
+            </a:schemeClr>
+          </a:solidFill>
+          <a:ln>
+            <a:noFill/>
+          </a:ln>
+        </p:spPr>
+        <p:style>
+          <a:lnRef idx="3">
+            <a:schemeClr val="lt1"/>
+          </a:lnRef>
+          <a:fillRef idx="1">
+            <a:schemeClr val="dk1"/>
+          </a:fillRef>
+          <a:effectRef idx="1">
+            <a:schemeClr val="dk1"/>
+          </a:effectRef>
+          <a:fontRef idx="minor">
+            <a:schemeClr val="lt1"/>
+          </a:fontRef>
+        </p:style>
+        <p:txBody>
+          <a:bodyPr rtlCol="0" anchor="ctr"/>
+          <a:lstStyle/>
+          <a:p>
+            <a:pPr algn="ctr"/>
+            <a:endParaRPr lang="pt-PT" b="1" dirty="0">
+              <a:solidFill>
+                <a:srgbClr val="FFFFFF"/>
+              </a:solidFill>
+            </a:endParaRPr>
+          </a:p>
+        </p:txBody>
+      </p:sp>
+      <p:sp>
+        <p:nvSpPr>
+          <p:cNvPr id="3" name="Content Placeholder 2">
+            <a:extLst>
+              <a:ext uri="{FF2B5EF4-FFF2-40B4-BE49-F238E27FC236}">
+                <a16:creationId xmlns:a16="http://schemas.microsoft.com/office/drawing/2014/main" id="{7B4CAC43-86D4-4602-BECF-F945CF861AAA}"/>
+              </a:ext>
+            </a:extLst>
+          </p:cNvPr>
+          <p:cNvSpPr>
+            <a:spLocks noGrp="1"/>
+          </p:cNvSpPr>
+          <p:nvPr>
+            <p:ph idx="1"/>
+          </p:nvPr>
+        </p:nvSpPr>
+        <p:spPr>
+          <a:xfrm>
+            <a:off x="278401" y="1619180"/>
+            <a:ext cx="6172200" cy="7753420"/>
+          </a:xfrm>
+        </p:spPr>
+        <p:txBody>
+          <a:bodyPr>
+            <a:normAutofit/>
+          </a:bodyPr>
+          <a:lstStyle/>
+          <a:p>
+            <a:pPr marL="0" indent="0">
+              <a:buNone/>
+            </a:pPr>
+            <a:r>
+              <a:rPr lang="en-US" sz="1200" dirty="0"/>
+              <a:t>Dear Hiring Manager,</a:t>
+            </a:r>
+          </a:p>
+          <a:p>
+            <a:pPr marL="0" indent="0">
+              <a:buNone/>
+            </a:pPr>
+            <a:endParaRPr lang="en-US" sz="1200" dirty="0"/>
+          </a:p>
+          <a:p>
+            <a:pPr marL="0" indent="0">
+              <a:buNone/>
+            </a:pPr>
+            <a:r>
+              <a:rPr lang="en-US" sz="1200" dirty="0"/>
+              <a:t>After being contacted through </a:t>
+            </a:r>
+            <a:r>
+              <a:rPr lang="en-US" sz="1200" dirty="0" err="1"/>
+              <a:t>Linkedin</a:t>
+            </a:r>
+            <a:r>
+              <a:rPr lang="en-US" sz="1200" dirty="0"/>
+              <a:t> I have been </a:t>
+            </a:r>
+            <a:r>
+              <a:rPr lang="en-US" sz="1200"/>
+              <a:t>adverted that </a:t>
+            </a:r>
+            <a:r>
+              <a:rPr lang="en-US" sz="1200" dirty="0"/>
+              <a:t>you are looking for an educated and enthusiastic employee for your company. At this moment I have completed a Bachelor of Science on computer engineering and feel quite ready and excited to position myself on the free job market.</a:t>
+            </a:r>
+          </a:p>
+          <a:p>
+            <a:pPr marL="0" indent="0">
+              <a:buNone/>
+            </a:pPr>
+            <a:r>
+              <a:rPr lang="en-US" sz="1200" dirty="0"/>
+              <a:t>I am particularly looking forward to working under an international company such as Amaris.</a:t>
+            </a:r>
+          </a:p>
+          <a:p>
+            <a:pPr marL="0" indent="0">
+              <a:buNone/>
+            </a:pPr>
+            <a:endParaRPr lang="en-US" sz="1200" dirty="0"/>
+          </a:p>
+          <a:p>
+            <a:pPr marL="0" indent="0">
+              <a:buNone/>
+            </a:pPr>
+            <a:r>
+              <a:rPr lang="en-US" sz="1200" dirty="0"/>
+              <a:t>I’m excited about the possibility of working abroad, having previously lived abroad in the UK, I can attest to how formative it was to experience a different culture on a day to day basis, I am particularly thankful for the world of literature that was open to me thanks to my further mastery of the English language. I feel like this and other experiences have solidified me as a person that can work in any type of environment with all sorts of co-workers.</a:t>
+            </a:r>
+          </a:p>
+          <a:p>
+            <a:pPr marL="0" indent="0">
+              <a:buNone/>
+            </a:pPr>
+            <a:endParaRPr lang="en-US" sz="1200" dirty="0"/>
+          </a:p>
+          <a:p>
+            <a:pPr marL="0" indent="0">
+              <a:buNone/>
+            </a:pPr>
+            <a:r>
+              <a:rPr lang="en-US" sz="1200" dirty="0"/>
+              <a:t>I am interested in consulting as I feel like it would be the perfect head start to my career. I possess a varied set of hard skills, which grants me a greater degree of freedom that I feel would be suited to the consulting business.</a:t>
+            </a:r>
+          </a:p>
+          <a:p>
+            <a:pPr marL="0" indent="0">
+              <a:buNone/>
+            </a:pPr>
+            <a:endParaRPr lang="en-US" sz="1200" dirty="0"/>
+          </a:p>
+          <a:p>
+            <a:pPr marL="0" indent="0">
+              <a:buNone/>
+            </a:pPr>
+            <a:r>
+              <a:rPr lang="en-US" sz="1200" dirty="0"/>
+              <a:t>Ultimately, I feel like my profile and education are well suited for the job and I would gladly complete the first impressions you have of me in a personal interview</a:t>
+            </a:r>
+            <a:endParaRPr lang="en-GB" sz="1200" dirty="0"/>
+          </a:p>
+          <a:p>
+            <a:pPr marL="0" indent="0">
+              <a:buNone/>
+            </a:pPr>
+            <a:r>
+              <a:rPr lang="en-GB" sz="1200" dirty="0"/>
+              <a:t>H</a:t>
+            </a:r>
+            <a:r>
+              <a:rPr lang="pt-PT" sz="1200" dirty="0"/>
+              <a:t>oping to hear from you soon,</a:t>
+            </a:r>
+            <a:endParaRPr lang="en-GB" sz="1200" dirty="0"/>
+          </a:p>
+        </p:txBody>
+      </p:sp>
+      <p:pic>
+        <p:nvPicPr>
+          <p:cNvPr id="7" name="Picture 6">
+            <a:extLst>
+              <a:ext uri="{FF2B5EF4-FFF2-40B4-BE49-F238E27FC236}">
+                <a16:creationId xmlns:a16="http://schemas.microsoft.com/office/drawing/2014/main" id="{3A713ACB-D165-4528-A7B3-EBC4D8E4B829}"/>
+              </a:ext>
+            </a:extLst>
+          </p:cNvPr>
+          <p:cNvPicPr>
+            <a:picLocks noChangeAspect="1"/>
+          </p:cNvPicPr>
+          <p:nvPr/>
+        </p:nvPicPr>
+        <p:blipFill>
+          <a:blip r:embed="rId2"/>
+          <a:stretch>
+            <a:fillRect/>
+          </a:stretch>
+        </p:blipFill>
+        <p:spPr>
+          <a:xfrm>
+            <a:off x="51804" y="314030"/>
+            <a:ext cx="251997" cy="251997"/>
+          </a:xfrm>
+          <a:prstGeom prst="rect">
+            <a:avLst/>
+          </a:prstGeom>
+        </p:spPr>
+      </p:pic>
+      <p:pic>
+        <p:nvPicPr>
+          <p:cNvPr id="8" name="Picture 7">
+            <a:extLst>
+              <a:ext uri="{FF2B5EF4-FFF2-40B4-BE49-F238E27FC236}">
+                <a16:creationId xmlns:a16="http://schemas.microsoft.com/office/drawing/2014/main" id="{15E879E2-4E63-4170-A2A9-C3215AA773C9}"/>
+              </a:ext>
+            </a:extLst>
+          </p:cNvPr>
+          <p:cNvPicPr>
+            <a:picLocks noChangeAspect="1"/>
+          </p:cNvPicPr>
+          <p:nvPr/>
+        </p:nvPicPr>
+        <p:blipFill>
+          <a:blip r:embed="rId3"/>
+          <a:stretch>
+            <a:fillRect/>
+          </a:stretch>
+        </p:blipFill>
+        <p:spPr>
+          <a:xfrm>
+            <a:off x="26405" y="712007"/>
+            <a:ext cx="251996" cy="251996"/>
+          </a:xfrm>
+          <a:prstGeom prst="rect">
+            <a:avLst/>
+          </a:prstGeom>
+        </p:spPr>
+      </p:pic>
+      <p:pic>
+        <p:nvPicPr>
+          <p:cNvPr id="9" name="Picture 8">
+            <a:extLst>
+              <a:ext uri="{FF2B5EF4-FFF2-40B4-BE49-F238E27FC236}">
+                <a16:creationId xmlns:a16="http://schemas.microsoft.com/office/drawing/2014/main" id="{BAFB3566-946F-4752-8B02-F1FFBF452CF3}"/>
+              </a:ext>
+            </a:extLst>
+          </p:cNvPr>
+          <p:cNvPicPr>
+            <a:picLocks noChangeAspect="1"/>
+          </p:cNvPicPr>
+          <p:nvPr/>
+        </p:nvPicPr>
+        <p:blipFill>
+          <a:blip r:embed="rId4"/>
+          <a:stretch>
+            <a:fillRect/>
+          </a:stretch>
+        </p:blipFill>
+        <p:spPr>
+          <a:xfrm>
+            <a:off x="26403" y="1109983"/>
+            <a:ext cx="251998" cy="251998"/>
+          </a:xfrm>
+          <a:prstGeom prst="rect">
+            <a:avLst/>
+          </a:prstGeom>
+        </p:spPr>
+      </p:pic>
+      <p:sp>
+        <p:nvSpPr>
+          <p:cNvPr id="11" name="Content Placeholder 2">
+            <a:extLst>
+              <a:ext uri="{FF2B5EF4-FFF2-40B4-BE49-F238E27FC236}">
+                <a16:creationId xmlns:a16="http://schemas.microsoft.com/office/drawing/2014/main" id="{0BAFB9B2-6547-49DD-8B0E-6F2129C7CAE7}"/>
+              </a:ext>
+            </a:extLst>
+          </p:cNvPr>
+          <p:cNvSpPr txBox="1">
+            <a:spLocks/>
+          </p:cNvSpPr>
+          <p:nvPr/>
+        </p:nvSpPr>
+        <p:spPr>
+          <a:xfrm>
+            <a:off x="26403" y="42052"/>
+            <a:ext cx="6717297" cy="2177323"/>
+          </a:xfrm>
+          <a:prstGeom prst="rect">
+            <a:avLst/>
+          </a:prstGeom>
+        </p:spPr>
+        <p:txBody>
+          <a:bodyPr vert="horz" lIns="91440" tIns="45720" rIns="91440" bIns="45720" rtlCol="0">
+            <a:normAutofit/>
+          </a:bodyPr>
+          <a:lstStyle>
+            <a:lvl1pPr marL="342900" indent="-342900" algn="l" defTabSz="457200" rtl="0" eaLnBrk="1" latinLnBrk="0" hangingPunct="1">
+              <a:spcBef>
+                <a:spcPct val="20000"/>
+              </a:spcBef>
+              <a:buFont typeface="Arial"/>
+              <a:buChar char="•"/>
+              <a:defRPr sz="3200" kern="1200">
+                <a:solidFill>
+                  <a:schemeClr val="tx1"/>
+                </a:solidFill>
+                <a:latin typeface="+mn-lt"/>
+                <a:ea typeface="+mn-ea"/>
+                <a:cs typeface="+mn-cs"/>
+              </a:defRPr>
+            </a:lvl1pPr>
+            <a:lvl2pPr marL="742950" indent="-285750" algn="l" defTabSz="457200" rtl="0" eaLnBrk="1" latinLnBrk="0" hangingPunct="1">
+              <a:spcBef>
+                <a:spcPct val="20000"/>
+              </a:spcBef>
+              <a:buFont typeface="Arial"/>
+              <a:buChar char="–"/>
+              <a:defRPr sz="2800" kern="1200">
+                <a:solidFill>
+                  <a:schemeClr val="tx1"/>
+                </a:solidFill>
+                <a:latin typeface="+mn-lt"/>
+                <a:ea typeface="+mn-ea"/>
+                <a:cs typeface="+mn-cs"/>
+              </a:defRPr>
+            </a:lvl2pPr>
+            <a:lvl3pPr marL="1143000" indent="-228600" algn="l" defTabSz="457200" rtl="0" eaLnBrk="1" latinLnBrk="0" hangingPunct="1">
+              <a:spcBef>
+                <a:spcPct val="20000"/>
+              </a:spcBef>
+              <a:buFont typeface="Arial"/>
+              <a:buChar char="•"/>
+              <a:defRPr sz="2400" kern="1200">
+                <a:solidFill>
+                  <a:schemeClr val="tx1"/>
+                </a:solidFill>
+                <a:latin typeface="+mn-lt"/>
+                <a:ea typeface="+mn-ea"/>
+                <a:cs typeface="+mn-cs"/>
+              </a:defRPr>
+            </a:lvl3pPr>
+            <a:lvl4pPr marL="1600200" indent="-228600" algn="l" defTabSz="457200" rtl="0" eaLnBrk="1" latinLnBrk="0" hangingPunct="1">
+              <a:spcBef>
+                <a:spcPct val="20000"/>
+              </a:spcBef>
+              <a:buFont typeface="Arial"/>
+              <a:buChar char="–"/>
+              <a:defRPr sz="2000" kern="1200">
+                <a:solidFill>
+                  <a:schemeClr val="tx1"/>
+                </a:solidFill>
+                <a:latin typeface="+mn-lt"/>
+                <a:ea typeface="+mn-ea"/>
+                <a:cs typeface="+mn-cs"/>
+              </a:defRPr>
+            </a:lvl4pPr>
+            <a:lvl5pPr marL="2057400" indent="-228600" algn="l" defTabSz="457200" rtl="0" eaLnBrk="1" latinLnBrk="0" hangingPunct="1">
+              <a:spcBef>
+                <a:spcPct val="20000"/>
+              </a:spcBef>
+              <a:buFont typeface="Arial"/>
+              <a:buChar char="»"/>
+              <a:defRPr sz="2000" kern="1200">
+                <a:solidFill>
+                  <a:schemeClr val="tx1"/>
+                </a:solidFill>
+                <a:latin typeface="+mn-lt"/>
+                <a:ea typeface="+mn-ea"/>
+                <a:cs typeface="+mn-cs"/>
+              </a:defRPr>
+            </a:lvl5pPr>
+            <a:lvl6pPr marL="2514600" indent="-228600" algn="l" defTabSz="457200" rtl="0" eaLnBrk="1" latinLnBrk="0" hangingPunct="1">
+              <a:spcBef>
+                <a:spcPct val="20000"/>
+              </a:spcBef>
+              <a:buFont typeface="Arial"/>
+              <a:buChar char="•"/>
+              <a:defRPr sz="2000" kern="1200">
+                <a:solidFill>
+                  <a:schemeClr val="tx1"/>
+                </a:solidFill>
+                <a:latin typeface="+mn-lt"/>
+                <a:ea typeface="+mn-ea"/>
+                <a:cs typeface="+mn-cs"/>
+              </a:defRPr>
+            </a:lvl6pPr>
+            <a:lvl7pPr marL="2971800" indent="-228600" algn="l" defTabSz="457200" rtl="0" eaLnBrk="1" latinLnBrk="0" hangingPunct="1">
+              <a:spcBef>
+                <a:spcPct val="20000"/>
+              </a:spcBef>
+              <a:buFont typeface="Arial"/>
+              <a:buChar char="•"/>
+              <a:defRPr sz="2000" kern="1200">
+                <a:solidFill>
+                  <a:schemeClr val="tx1"/>
+                </a:solidFill>
+                <a:latin typeface="+mn-lt"/>
+                <a:ea typeface="+mn-ea"/>
+                <a:cs typeface="+mn-cs"/>
+              </a:defRPr>
+            </a:lvl7pPr>
+            <a:lvl8pPr marL="3429000" indent="-228600" algn="l" defTabSz="457200" rtl="0" eaLnBrk="1" latinLnBrk="0" hangingPunct="1">
+              <a:spcBef>
+                <a:spcPct val="20000"/>
+              </a:spcBef>
+              <a:buFont typeface="Arial"/>
+              <a:buChar char="•"/>
+              <a:defRPr sz="2000" kern="1200">
+                <a:solidFill>
+                  <a:schemeClr val="tx1"/>
+                </a:solidFill>
+                <a:latin typeface="+mn-lt"/>
+                <a:ea typeface="+mn-ea"/>
+                <a:cs typeface="+mn-cs"/>
+              </a:defRPr>
+            </a:lvl8pPr>
+            <a:lvl9pPr marL="3886200" indent="-228600" algn="l" defTabSz="457200" rtl="0" eaLnBrk="1" latinLnBrk="0" hangingPunct="1">
+              <a:spcBef>
+                <a:spcPct val="20000"/>
+              </a:spcBef>
+              <a:buFont typeface="Arial"/>
+              <a:buChar char="•"/>
+              <a:defRPr sz="2000" kern="1200">
+                <a:solidFill>
+                  <a:schemeClr val="tx1"/>
+                </a:solidFill>
+                <a:latin typeface="+mn-lt"/>
+                <a:ea typeface="+mn-ea"/>
+                <a:cs typeface="+mn-cs"/>
+              </a:defRPr>
+            </a:lvl9pPr>
+          </a:lstStyle>
+          <a:p>
+            <a:pPr marL="0" indent="0">
+              <a:buNone/>
+            </a:pPr>
+            <a:r>
+              <a:rPr lang="pt-PT" sz="1200" b="1" dirty="0">
+                <a:solidFill>
+                  <a:srgbClr val="FFFFFF"/>
+                </a:solidFill>
+              </a:rPr>
+              <a:t>JOAQUIM ESTEVES</a:t>
+            </a:r>
+          </a:p>
+          <a:p>
+            <a:pPr marL="0" indent="0" algn="just">
+              <a:buNone/>
+            </a:pPr>
+            <a:r>
+              <a:rPr lang="pt-PT" sz="1200" dirty="0">
+                <a:solidFill>
+                  <a:srgbClr val="FFFFFF"/>
+                </a:solidFill>
+              </a:rPr>
+              <a:t>       Alameda dos Oceanos nº 95 4ºEsq, Lisboa. </a:t>
+            </a:r>
+            <a:r>
+              <a:rPr lang="en-GB" sz="1200" dirty="0">
+                <a:solidFill>
+                  <a:srgbClr val="FFFFFF"/>
+                </a:solidFill>
+              </a:rPr>
+              <a:t>1990 – 213 </a:t>
+            </a:r>
+            <a:r>
+              <a:rPr lang="pt-PT" sz="1200" b="1" dirty="0">
+                <a:solidFill>
+                  <a:srgbClr val="FFFFFF"/>
+                </a:solidFill>
+              </a:rPr>
+              <a:t>Portugal</a:t>
+            </a:r>
+          </a:p>
+          <a:p>
+            <a:pPr marL="0" indent="0" algn="just">
+              <a:buNone/>
+            </a:pPr>
+            <a:endParaRPr lang="en-GB" sz="1200" b="1" dirty="0">
+              <a:solidFill>
+                <a:srgbClr val="FFFFFF"/>
+              </a:solidFill>
+            </a:endParaRPr>
+          </a:p>
+          <a:p>
+            <a:pPr marL="0" indent="0" algn="just">
+              <a:buNone/>
+            </a:pPr>
+            <a:r>
+              <a:rPr lang="pt-PT" sz="1200" dirty="0">
+                <a:solidFill>
+                  <a:srgbClr val="FFFFFF"/>
+                </a:solidFill>
+              </a:rPr>
+              <a:t>       joaquimbve@hotmail.com</a:t>
+            </a:r>
+          </a:p>
+          <a:p>
+            <a:pPr marL="0" indent="0" algn="just">
+              <a:buNone/>
+            </a:pPr>
+            <a:r>
+              <a:rPr lang="pt-PT" sz="1200" i="1" dirty="0">
+                <a:solidFill>
+                  <a:srgbClr val="FFFFFF"/>
+                </a:solidFill>
+              </a:rPr>
+              <a:t> </a:t>
+            </a:r>
+          </a:p>
+          <a:p>
+            <a:pPr marL="0" indent="0" algn="just">
+              <a:buNone/>
+            </a:pPr>
+            <a:r>
+              <a:rPr lang="pt-PT" sz="1200" dirty="0">
+                <a:solidFill>
+                  <a:srgbClr val="FFFFFF"/>
+                </a:solidFill>
+              </a:rPr>
+              <a:t>      +351 91 399 39 37</a:t>
+            </a:r>
+          </a:p>
+          <a:p>
+            <a:pPr marL="0" indent="0" algn="just">
+              <a:buNone/>
+            </a:pPr>
+            <a:endParaRPr lang="pt-PT" sz="1200" dirty="0">
+              <a:solidFill>
+                <a:srgbClr val="FFFFFF"/>
+              </a:solidFill>
+            </a:endParaRPr>
+          </a:p>
+          <a:p>
+            <a:pPr marL="0" indent="0" algn="just">
+              <a:buNone/>
+            </a:pPr>
+            <a:endParaRPr lang="pt-PT" sz="1200" b="1" dirty="0">
+              <a:solidFill>
+                <a:srgbClr val="FFFFFF"/>
+              </a:solidFill>
+            </a:endParaRPr>
+          </a:p>
+          <a:p>
+            <a:pPr marL="0" indent="0">
+              <a:buNone/>
+            </a:pPr>
+            <a:endParaRPr lang="pt-PT" sz="1200" b="1" dirty="0">
+              <a:solidFill>
+                <a:srgbClr val="FFFFFF"/>
+              </a:solidFill>
+            </a:endParaRPr>
+          </a:p>
+        </p:txBody>
+      </p:sp>
+      <p:pic>
+        <p:nvPicPr>
+          <p:cNvPr id="12" name="Picture 11">
+            <a:extLst>
+              <a:ext uri="{FF2B5EF4-FFF2-40B4-BE49-F238E27FC236}">
+                <a16:creationId xmlns:a16="http://schemas.microsoft.com/office/drawing/2014/main" id="{2CC18643-B116-468C-8F29-4429A9AE0DF7}"/>
+              </a:ext>
+            </a:extLst>
+          </p:cNvPr>
+          <p:cNvPicPr>
+            <a:picLocks noChangeAspect="1"/>
+          </p:cNvPicPr>
+          <p:nvPr/>
+        </p:nvPicPr>
+        <p:blipFill>
+          <a:blip r:embed="rId5"/>
+          <a:stretch>
+            <a:fillRect/>
+          </a:stretch>
+        </p:blipFill>
+        <p:spPr>
+          <a:xfrm>
+            <a:off x="468901" y="6328155"/>
+            <a:ext cx="1722124" cy="399289"/>
+          </a:xfrm>
+          <a:prstGeom prst="rect">
+            <a:avLst/>
+          </a:prstGeom>
+        </p:spPr>
+      </p:pic>
+    </p:spTree>
+    <p:extLst>
+      <p:ext uri="{BB962C8B-B14F-4D97-AF65-F5344CB8AC3E}">
+        <p14:creationId xmlns:p14="http://schemas.microsoft.com/office/powerpoint/2010/main" val="1801898510"/>
+      </p:ext>
+    </p:extLst>
+  </p:cSld>
+  <p:clrMapOvr>
+    <a:masterClrMapping/>
+  </p:clrMapOvr>
+</p:sld>
+</file>
+
+<file path=ppt/slides/slide3.xml><?xml version="1.0" encoding="utf-8"?>
+<p:sld xmlns:a="http://schemas.openxmlformats.org/drawingml/2006/main" xmlns:r="http://schemas.openxmlformats.org/officeDocument/2006/relationships" xmlns:p="http://schemas.openxmlformats.org/presentationml/2006/main">
+  <p:cSld>
+    <p:spTree>
+      <p:nvGrpSpPr>
+        <p:cNvPr id="1" name=""/>
+        <p:cNvGrpSpPr/>
+        <p:nvPr/>
+      </p:nvGrpSpPr>
+      <p:grpSpPr>
+        <a:xfrm>
+          <a:off x="0" y="0"/>
+          <a:ext cx="0" cy="0"/>
+          <a:chOff x="0" y="0"/>
+          <a:chExt cx="0" cy="0"/>
+        </a:xfrm>
+      </p:grpSpPr>
+      <p:pic>
+        <p:nvPicPr>
+          <p:cNvPr id="5" name="Picture 4">
+            <a:extLst>
+              <a:ext uri="{FF2B5EF4-FFF2-40B4-BE49-F238E27FC236}">
+                <a16:creationId xmlns:a16="http://schemas.microsoft.com/office/drawing/2014/main" id="{B656B213-8F65-4A07-8E7B-2BD726D132B7}"/>
+              </a:ext>
+            </a:extLst>
+          </p:cNvPr>
+          <p:cNvPicPr>
+            <a:picLocks noChangeAspect="1"/>
+          </p:cNvPicPr>
+          <p:nvPr/>
+        </p:nvPicPr>
+        <p:blipFill>
+          <a:blip r:embed="rId2"/>
+          <a:stretch>
+            <a:fillRect/>
+          </a:stretch>
+        </p:blipFill>
+        <p:spPr>
+          <a:xfrm>
+            <a:off x="0" y="406400"/>
+            <a:ext cx="6790730" cy="9296400"/>
+          </a:xfrm>
+          <a:prstGeom prst="rect">
+            <a:avLst/>
+          </a:prstGeom>
+        </p:spPr>
+      </p:pic>
+    </p:spTree>
+    <p:extLst>
+      <p:ext uri="{BB962C8B-B14F-4D97-AF65-F5344CB8AC3E}">
+        <p14:creationId xmlns:p14="http://schemas.microsoft.com/office/powerpoint/2010/main" val="4024891644"/>
       </p:ext>
     </p:extLst>
   </p:cSld>

</xml_diff>